<commit_message>
[#120] Documentation Edits (#115)
* Guides: Edit for style, Add sections
* Add stylesheet for PDF export
* DeveloperGuide: Edit Architecture section
App.F: Revert changes, Add section stub
* Update diagrams
* Update for v1.4
</commit_message>
<xml_diff>
--- a/docs/diagrams/ModelComponentClassDiagram.pptx
+++ b/docs/diagrams/ModelComponentClassDiagram.pptx
@@ -208,7 +208,7 @@
           <a:p>
             <a:fld id="{F5CC4B3F-88C1-4FFA-B1B6-F41C21DC6924}" type="datetimeFigureOut">
               <a:rPr lang="en-US" smtClean="0"/>
-              <a:t>1/1/18</a:t>
+              <a:t>05-Apr-18</a:t>
             </a:fld>
             <a:endParaRPr lang="en-US"/>
           </a:p>
@@ -272,38 +272,37 @@
           <a:p>
             <a:pPr lvl="0"/>
             <a:r>
-              <a:rPr lang="en-US" smtClean="0"/>
+              <a:rPr lang="en-US"/>
               <a:t>Click to edit Master text styles</a:t>
             </a:r>
           </a:p>
           <a:p>
             <a:pPr lvl="1"/>
             <a:r>
-              <a:rPr lang="en-US" smtClean="0"/>
+              <a:rPr lang="en-US"/>
               <a:t>Second level</a:t>
             </a:r>
           </a:p>
           <a:p>
             <a:pPr lvl="2"/>
             <a:r>
-              <a:rPr lang="en-US" smtClean="0"/>
+              <a:rPr lang="en-US"/>
               <a:t>Third level</a:t>
             </a:r>
           </a:p>
           <a:p>
             <a:pPr lvl="3"/>
             <a:r>
-              <a:rPr lang="en-US" smtClean="0"/>
+              <a:rPr lang="en-US"/>
               <a:t>Fourth level</a:t>
             </a:r>
           </a:p>
           <a:p>
             <a:pPr lvl="4"/>
             <a:r>
-              <a:rPr lang="en-US" smtClean="0"/>
+              <a:rPr lang="en-US"/>
               <a:t>Fifth level</a:t>
             </a:r>
-            <a:endParaRPr lang="en-US"/>
           </a:p>
         </p:txBody>
       </p:sp>
@@ -514,10 +513,9 @@
           <a:lstStyle/>
           <a:p>
             <a:r>
-              <a:rPr lang="en-US" smtClean="0"/>
+              <a:rPr lang="en-US"/>
               <a:t>Click to edit Master title style</a:t>
             </a:r>
-            <a:endParaRPr lang="en-US"/>
           </a:p>
         </p:txBody>
       </p:sp>
@@ -633,10 +631,9 @@
           </a:lstStyle>
           <a:p>
             <a:r>
-              <a:rPr lang="en-US" smtClean="0"/>
+              <a:rPr lang="en-US"/>
               <a:t>Click to edit Master subtitle style</a:t>
             </a:r>
-            <a:endParaRPr lang="en-US"/>
           </a:p>
         </p:txBody>
       </p:sp>
@@ -657,7 +654,7 @@
           <a:p>
             <a:fld id="{78C97017-6FC3-485B-9764-EAC9E56C1D49}" type="datetimeFigureOut">
               <a:rPr lang="en-US" smtClean="0"/>
-              <a:t>1/1/18</a:t>
+              <a:t>05-Apr-18</a:t>
             </a:fld>
             <a:endParaRPr lang="en-US"/>
           </a:p>
@@ -751,10 +748,9 @@
           <a:lstStyle/>
           <a:p>
             <a:r>
-              <a:rPr lang="en-US" smtClean="0"/>
+              <a:rPr lang="en-US"/>
               <a:t>Click to edit Master title style</a:t>
             </a:r>
-            <a:endParaRPr lang="en-US"/>
           </a:p>
         </p:txBody>
       </p:sp>
@@ -775,38 +771,37 @@
           <a:p>
             <a:pPr lvl="0"/>
             <a:r>
-              <a:rPr lang="en-US" smtClean="0"/>
+              <a:rPr lang="en-US"/>
               <a:t>Click to edit Master text styles</a:t>
             </a:r>
           </a:p>
           <a:p>
             <a:pPr lvl="1"/>
             <a:r>
-              <a:rPr lang="en-US" smtClean="0"/>
+              <a:rPr lang="en-US"/>
               <a:t>Second level</a:t>
             </a:r>
           </a:p>
           <a:p>
             <a:pPr lvl="2"/>
             <a:r>
-              <a:rPr lang="en-US" smtClean="0"/>
+              <a:rPr lang="en-US"/>
               <a:t>Third level</a:t>
             </a:r>
           </a:p>
           <a:p>
             <a:pPr lvl="3"/>
             <a:r>
-              <a:rPr lang="en-US" smtClean="0"/>
+              <a:rPr lang="en-US"/>
               <a:t>Fourth level</a:t>
             </a:r>
           </a:p>
           <a:p>
             <a:pPr lvl="4"/>
             <a:r>
-              <a:rPr lang="en-US" smtClean="0"/>
+              <a:rPr lang="en-US"/>
               <a:t>Fifth level</a:t>
             </a:r>
-            <a:endParaRPr lang="en-US"/>
           </a:p>
         </p:txBody>
       </p:sp>
@@ -827,7 +822,7 @@
           <a:p>
             <a:fld id="{78C97017-6FC3-485B-9764-EAC9E56C1D49}" type="datetimeFigureOut">
               <a:rPr lang="en-US" smtClean="0"/>
-              <a:t>1/1/18</a:t>
+              <a:t>05-Apr-18</a:t>
             </a:fld>
             <a:endParaRPr lang="en-US"/>
           </a:p>
@@ -926,10 +921,9 @@
           <a:lstStyle/>
           <a:p>
             <a:r>
-              <a:rPr lang="en-US" smtClean="0"/>
+              <a:rPr lang="en-US"/>
               <a:t>Click to edit Master title style</a:t>
             </a:r>
-            <a:endParaRPr lang="en-US"/>
           </a:p>
         </p:txBody>
       </p:sp>
@@ -955,38 +949,37 @@
           <a:p>
             <a:pPr lvl="0"/>
             <a:r>
-              <a:rPr lang="en-US" smtClean="0"/>
+              <a:rPr lang="en-US"/>
               <a:t>Click to edit Master text styles</a:t>
             </a:r>
           </a:p>
           <a:p>
             <a:pPr lvl="1"/>
             <a:r>
-              <a:rPr lang="en-US" smtClean="0"/>
+              <a:rPr lang="en-US"/>
               <a:t>Second level</a:t>
             </a:r>
           </a:p>
           <a:p>
             <a:pPr lvl="2"/>
             <a:r>
-              <a:rPr lang="en-US" smtClean="0"/>
+              <a:rPr lang="en-US"/>
               <a:t>Third level</a:t>
             </a:r>
           </a:p>
           <a:p>
             <a:pPr lvl="3"/>
             <a:r>
-              <a:rPr lang="en-US" smtClean="0"/>
+              <a:rPr lang="en-US"/>
               <a:t>Fourth level</a:t>
             </a:r>
           </a:p>
           <a:p>
             <a:pPr lvl="4"/>
             <a:r>
-              <a:rPr lang="en-US" smtClean="0"/>
+              <a:rPr lang="en-US"/>
               <a:t>Fifth level</a:t>
             </a:r>
-            <a:endParaRPr lang="en-US"/>
           </a:p>
         </p:txBody>
       </p:sp>
@@ -1007,7 +1000,7 @@
           <a:p>
             <a:fld id="{78C97017-6FC3-485B-9764-EAC9E56C1D49}" type="datetimeFigureOut">
               <a:rPr lang="en-US" smtClean="0"/>
-              <a:t>1/1/18</a:t>
+              <a:t>05-Apr-18</a:t>
             </a:fld>
             <a:endParaRPr lang="en-US"/>
           </a:p>
@@ -1101,10 +1094,9 @@
           <a:lstStyle/>
           <a:p>
             <a:r>
-              <a:rPr lang="en-US" smtClean="0"/>
+              <a:rPr lang="en-US"/>
               <a:t>Click to edit Master title style</a:t>
             </a:r>
-            <a:endParaRPr lang="en-US"/>
           </a:p>
         </p:txBody>
       </p:sp>
@@ -1125,38 +1117,37 @@
           <a:p>
             <a:pPr lvl="0"/>
             <a:r>
-              <a:rPr lang="en-US" smtClean="0"/>
+              <a:rPr lang="en-US"/>
               <a:t>Click to edit Master text styles</a:t>
             </a:r>
           </a:p>
           <a:p>
             <a:pPr lvl="1"/>
             <a:r>
-              <a:rPr lang="en-US" smtClean="0"/>
+              <a:rPr lang="en-US"/>
               <a:t>Second level</a:t>
             </a:r>
           </a:p>
           <a:p>
             <a:pPr lvl="2"/>
             <a:r>
-              <a:rPr lang="en-US" smtClean="0"/>
+              <a:rPr lang="en-US"/>
               <a:t>Third level</a:t>
             </a:r>
           </a:p>
           <a:p>
             <a:pPr lvl="3"/>
             <a:r>
-              <a:rPr lang="en-US" smtClean="0"/>
+              <a:rPr lang="en-US"/>
               <a:t>Fourth level</a:t>
             </a:r>
           </a:p>
           <a:p>
             <a:pPr lvl="4"/>
             <a:r>
-              <a:rPr lang="en-US" smtClean="0"/>
+              <a:rPr lang="en-US"/>
               <a:t>Fifth level</a:t>
             </a:r>
-            <a:endParaRPr lang="en-US"/>
           </a:p>
         </p:txBody>
       </p:sp>
@@ -1177,7 +1168,7 @@
           <a:p>
             <a:fld id="{78C97017-6FC3-485B-9764-EAC9E56C1D49}" type="datetimeFigureOut">
               <a:rPr lang="en-US" smtClean="0"/>
-              <a:t>1/1/18</a:t>
+              <a:t>05-Apr-18</a:t>
             </a:fld>
             <a:endParaRPr lang="en-US"/>
           </a:p>
@@ -1280,10 +1271,9 @@
           </a:lstStyle>
           <a:p>
             <a:r>
-              <a:rPr lang="en-US" smtClean="0"/>
+              <a:rPr lang="en-US"/>
               <a:t>Click to edit Master title style</a:t>
             </a:r>
-            <a:endParaRPr lang="en-US"/>
           </a:p>
         </p:txBody>
       </p:sp>
@@ -1400,7 +1390,7 @@
           <a:p>
             <a:pPr lvl="0"/>
             <a:r>
-              <a:rPr lang="en-US" smtClean="0"/>
+              <a:rPr lang="en-US"/>
               <a:t>Click to edit Master text styles</a:t>
             </a:r>
           </a:p>
@@ -1423,7 +1413,7 @@
           <a:p>
             <a:fld id="{78C97017-6FC3-485B-9764-EAC9E56C1D49}" type="datetimeFigureOut">
               <a:rPr lang="en-US" smtClean="0"/>
-              <a:t>1/1/18</a:t>
+              <a:t>05-Apr-18</a:t>
             </a:fld>
             <a:endParaRPr lang="en-US"/>
           </a:p>
@@ -1517,10 +1507,9 @@
           <a:lstStyle/>
           <a:p>
             <a:r>
-              <a:rPr lang="en-US" smtClean="0"/>
+              <a:rPr lang="en-US"/>
               <a:t>Click to edit Master title style</a:t>
             </a:r>
-            <a:endParaRPr lang="en-US"/>
           </a:p>
         </p:txBody>
       </p:sp>
@@ -1574,38 +1563,37 @@
           <a:p>
             <a:pPr lvl="0"/>
             <a:r>
-              <a:rPr lang="en-US" smtClean="0"/>
+              <a:rPr lang="en-US"/>
               <a:t>Click to edit Master text styles</a:t>
             </a:r>
           </a:p>
           <a:p>
             <a:pPr lvl="1"/>
             <a:r>
-              <a:rPr lang="en-US" smtClean="0"/>
+              <a:rPr lang="en-US"/>
               <a:t>Second level</a:t>
             </a:r>
           </a:p>
           <a:p>
             <a:pPr lvl="2"/>
             <a:r>
-              <a:rPr lang="en-US" smtClean="0"/>
+              <a:rPr lang="en-US"/>
               <a:t>Third level</a:t>
             </a:r>
           </a:p>
           <a:p>
             <a:pPr lvl="3"/>
             <a:r>
-              <a:rPr lang="en-US" smtClean="0"/>
+              <a:rPr lang="en-US"/>
               <a:t>Fourth level</a:t>
             </a:r>
           </a:p>
           <a:p>
             <a:pPr lvl="4"/>
             <a:r>
-              <a:rPr lang="en-US" smtClean="0"/>
+              <a:rPr lang="en-US"/>
               <a:t>Fifth level</a:t>
             </a:r>
-            <a:endParaRPr lang="en-US"/>
           </a:p>
         </p:txBody>
       </p:sp>
@@ -1659,38 +1647,37 @@
           <a:p>
             <a:pPr lvl="0"/>
             <a:r>
-              <a:rPr lang="en-US" smtClean="0"/>
+              <a:rPr lang="en-US"/>
               <a:t>Click to edit Master text styles</a:t>
             </a:r>
           </a:p>
           <a:p>
             <a:pPr lvl="1"/>
             <a:r>
-              <a:rPr lang="en-US" smtClean="0"/>
+              <a:rPr lang="en-US"/>
               <a:t>Second level</a:t>
             </a:r>
           </a:p>
           <a:p>
             <a:pPr lvl="2"/>
             <a:r>
-              <a:rPr lang="en-US" smtClean="0"/>
+              <a:rPr lang="en-US"/>
               <a:t>Third level</a:t>
             </a:r>
           </a:p>
           <a:p>
             <a:pPr lvl="3"/>
             <a:r>
-              <a:rPr lang="en-US" smtClean="0"/>
+              <a:rPr lang="en-US"/>
               <a:t>Fourth level</a:t>
             </a:r>
           </a:p>
           <a:p>
             <a:pPr lvl="4"/>
             <a:r>
-              <a:rPr lang="en-US" smtClean="0"/>
+              <a:rPr lang="en-US"/>
               <a:t>Fifth level</a:t>
             </a:r>
-            <a:endParaRPr lang="en-US"/>
           </a:p>
         </p:txBody>
       </p:sp>
@@ -1711,7 +1698,7 @@
           <a:p>
             <a:fld id="{78C97017-6FC3-485B-9764-EAC9E56C1D49}" type="datetimeFigureOut">
               <a:rPr lang="en-US" smtClean="0"/>
-              <a:t>1/1/18</a:t>
+              <a:t>05-Apr-18</a:t>
             </a:fld>
             <a:endParaRPr lang="en-US"/>
           </a:p>
@@ -1809,10 +1796,9 @@
           </a:lstStyle>
           <a:p>
             <a:r>
-              <a:rPr lang="en-US" smtClean="0"/>
+              <a:rPr lang="en-US"/>
               <a:t>Click to edit Master title style</a:t>
             </a:r>
-            <a:endParaRPr lang="en-US"/>
           </a:p>
         </p:txBody>
       </p:sp>
@@ -1875,7 +1861,7 @@
           <a:p>
             <a:pPr lvl="0"/>
             <a:r>
-              <a:rPr lang="en-US" smtClean="0"/>
+              <a:rPr lang="en-US"/>
               <a:t>Click to edit Master text styles</a:t>
             </a:r>
           </a:p>
@@ -1931,38 +1917,37 @@
           <a:p>
             <a:pPr lvl="0"/>
             <a:r>
-              <a:rPr lang="en-US" smtClean="0"/>
+              <a:rPr lang="en-US"/>
               <a:t>Click to edit Master text styles</a:t>
             </a:r>
           </a:p>
           <a:p>
             <a:pPr lvl="1"/>
             <a:r>
-              <a:rPr lang="en-US" smtClean="0"/>
+              <a:rPr lang="en-US"/>
               <a:t>Second level</a:t>
             </a:r>
           </a:p>
           <a:p>
             <a:pPr lvl="2"/>
             <a:r>
-              <a:rPr lang="en-US" smtClean="0"/>
+              <a:rPr lang="en-US"/>
               <a:t>Third level</a:t>
             </a:r>
           </a:p>
           <a:p>
             <a:pPr lvl="3"/>
             <a:r>
-              <a:rPr lang="en-US" smtClean="0"/>
+              <a:rPr lang="en-US"/>
               <a:t>Fourth level</a:t>
             </a:r>
           </a:p>
           <a:p>
             <a:pPr lvl="4"/>
             <a:r>
-              <a:rPr lang="en-US" smtClean="0"/>
+              <a:rPr lang="en-US"/>
               <a:t>Fifth level</a:t>
             </a:r>
-            <a:endParaRPr lang="en-US"/>
           </a:p>
         </p:txBody>
       </p:sp>
@@ -2025,7 +2010,7 @@
           <a:p>
             <a:pPr lvl="0"/>
             <a:r>
-              <a:rPr lang="en-US" smtClean="0"/>
+              <a:rPr lang="en-US"/>
               <a:t>Click to edit Master text styles</a:t>
             </a:r>
           </a:p>
@@ -2081,38 +2066,37 @@
           <a:p>
             <a:pPr lvl="0"/>
             <a:r>
-              <a:rPr lang="en-US" smtClean="0"/>
+              <a:rPr lang="en-US"/>
               <a:t>Click to edit Master text styles</a:t>
             </a:r>
           </a:p>
           <a:p>
             <a:pPr lvl="1"/>
             <a:r>
-              <a:rPr lang="en-US" smtClean="0"/>
+              <a:rPr lang="en-US"/>
               <a:t>Second level</a:t>
             </a:r>
           </a:p>
           <a:p>
             <a:pPr lvl="2"/>
             <a:r>
-              <a:rPr lang="en-US" smtClean="0"/>
+              <a:rPr lang="en-US"/>
               <a:t>Third level</a:t>
             </a:r>
           </a:p>
           <a:p>
             <a:pPr lvl="3"/>
             <a:r>
-              <a:rPr lang="en-US" smtClean="0"/>
+              <a:rPr lang="en-US"/>
               <a:t>Fourth level</a:t>
             </a:r>
           </a:p>
           <a:p>
             <a:pPr lvl="4"/>
             <a:r>
-              <a:rPr lang="en-US" smtClean="0"/>
+              <a:rPr lang="en-US"/>
               <a:t>Fifth level</a:t>
             </a:r>
-            <a:endParaRPr lang="en-US"/>
           </a:p>
         </p:txBody>
       </p:sp>
@@ -2133,7 +2117,7 @@
           <a:p>
             <a:fld id="{78C97017-6FC3-485B-9764-EAC9E56C1D49}" type="datetimeFigureOut">
               <a:rPr lang="en-US" smtClean="0"/>
-              <a:t>1/1/18</a:t>
+              <a:t>05-Apr-18</a:t>
             </a:fld>
             <a:endParaRPr lang="en-US"/>
           </a:p>
@@ -2227,10 +2211,9 @@
           <a:lstStyle/>
           <a:p>
             <a:r>
-              <a:rPr lang="en-US" smtClean="0"/>
+              <a:rPr lang="en-US"/>
               <a:t>Click to edit Master title style</a:t>
             </a:r>
-            <a:endParaRPr lang="en-US"/>
           </a:p>
         </p:txBody>
       </p:sp>
@@ -2251,7 +2234,7 @@
           <a:p>
             <a:fld id="{78C97017-6FC3-485B-9764-EAC9E56C1D49}" type="datetimeFigureOut">
               <a:rPr lang="en-US" smtClean="0"/>
-              <a:t>1/1/18</a:t>
+              <a:t>05-Apr-18</a:t>
             </a:fld>
             <a:endParaRPr lang="en-US"/>
           </a:p>
@@ -2346,7 +2329,7 @@
           <a:p>
             <a:fld id="{78C97017-6FC3-485B-9764-EAC9E56C1D49}" type="datetimeFigureOut">
               <a:rPr lang="en-US" smtClean="0"/>
-              <a:t>1/1/18</a:t>
+              <a:t>05-Apr-18</a:t>
             </a:fld>
             <a:endParaRPr lang="en-US"/>
           </a:p>
@@ -2449,10 +2432,9 @@
           </a:lstStyle>
           <a:p>
             <a:r>
-              <a:rPr lang="en-US" smtClean="0"/>
+              <a:rPr lang="en-US"/>
               <a:t>Click to edit Master title style</a:t>
             </a:r>
-            <a:endParaRPr lang="en-US"/>
           </a:p>
         </p:txBody>
       </p:sp>
@@ -2506,38 +2488,37 @@
           <a:p>
             <a:pPr lvl="0"/>
             <a:r>
-              <a:rPr lang="en-US" smtClean="0"/>
+              <a:rPr lang="en-US"/>
               <a:t>Click to edit Master text styles</a:t>
             </a:r>
           </a:p>
           <a:p>
             <a:pPr lvl="1"/>
             <a:r>
-              <a:rPr lang="en-US" smtClean="0"/>
+              <a:rPr lang="en-US"/>
               <a:t>Second level</a:t>
             </a:r>
           </a:p>
           <a:p>
             <a:pPr lvl="2"/>
             <a:r>
-              <a:rPr lang="en-US" smtClean="0"/>
+              <a:rPr lang="en-US"/>
               <a:t>Third level</a:t>
             </a:r>
           </a:p>
           <a:p>
             <a:pPr lvl="3"/>
             <a:r>
-              <a:rPr lang="en-US" smtClean="0"/>
+              <a:rPr lang="en-US"/>
               <a:t>Fourth level</a:t>
             </a:r>
           </a:p>
           <a:p>
             <a:pPr lvl="4"/>
             <a:r>
-              <a:rPr lang="en-US" smtClean="0"/>
+              <a:rPr lang="en-US"/>
               <a:t>Fifth level</a:t>
             </a:r>
-            <a:endParaRPr lang="en-US"/>
           </a:p>
         </p:txBody>
       </p:sp>
@@ -2600,7 +2581,7 @@
           <a:p>
             <a:pPr lvl="0"/>
             <a:r>
-              <a:rPr lang="en-US" smtClean="0"/>
+              <a:rPr lang="en-US"/>
               <a:t>Click to edit Master text styles</a:t>
             </a:r>
           </a:p>
@@ -2623,7 +2604,7 @@
           <a:p>
             <a:fld id="{78C97017-6FC3-485B-9764-EAC9E56C1D49}" type="datetimeFigureOut">
               <a:rPr lang="en-US" smtClean="0"/>
-              <a:t>1/1/18</a:t>
+              <a:t>05-Apr-18</a:t>
             </a:fld>
             <a:endParaRPr lang="en-US"/>
           </a:p>
@@ -2726,10 +2707,9 @@
           </a:lstStyle>
           <a:p>
             <a:r>
-              <a:rPr lang="en-US" smtClean="0"/>
+              <a:rPr lang="en-US"/>
               <a:t>Click to edit Master title style</a:t>
             </a:r>
-            <a:endParaRPr lang="en-US"/>
           </a:p>
         </p:txBody>
       </p:sp>
@@ -2853,7 +2833,7 @@
           <a:p>
             <a:pPr lvl="0"/>
             <a:r>
-              <a:rPr lang="en-US" smtClean="0"/>
+              <a:rPr lang="en-US"/>
               <a:t>Click to edit Master text styles</a:t>
             </a:r>
           </a:p>
@@ -2876,7 +2856,7 @@
           <a:p>
             <a:fld id="{78C97017-6FC3-485B-9764-EAC9E56C1D49}" type="datetimeFigureOut">
               <a:rPr lang="en-US" smtClean="0"/>
-              <a:t>1/1/18</a:t>
+              <a:t>05-Apr-18</a:t>
             </a:fld>
             <a:endParaRPr lang="en-US"/>
           </a:p>
@@ -2985,10 +2965,9 @@
           <a:lstStyle/>
           <a:p>
             <a:r>
-              <a:rPr lang="en-US" smtClean="0"/>
+              <a:rPr lang="en-US"/>
               <a:t>Click to edit Master title style</a:t>
             </a:r>
-            <a:endParaRPr lang="en-US"/>
           </a:p>
         </p:txBody>
       </p:sp>
@@ -3019,38 +2998,37 @@
           <a:p>
             <a:pPr lvl="0"/>
             <a:r>
-              <a:rPr lang="en-US" smtClean="0"/>
+              <a:rPr lang="en-US"/>
               <a:t>Click to edit Master text styles</a:t>
             </a:r>
           </a:p>
           <a:p>
             <a:pPr lvl="1"/>
             <a:r>
-              <a:rPr lang="en-US" smtClean="0"/>
+              <a:rPr lang="en-US"/>
               <a:t>Second level</a:t>
             </a:r>
           </a:p>
           <a:p>
             <a:pPr lvl="2"/>
             <a:r>
-              <a:rPr lang="en-US" smtClean="0"/>
+              <a:rPr lang="en-US"/>
               <a:t>Third level</a:t>
             </a:r>
           </a:p>
           <a:p>
             <a:pPr lvl="3"/>
             <a:r>
-              <a:rPr lang="en-US" smtClean="0"/>
+              <a:rPr lang="en-US"/>
               <a:t>Fourth level</a:t>
             </a:r>
           </a:p>
           <a:p>
             <a:pPr lvl="4"/>
             <a:r>
-              <a:rPr lang="en-US" smtClean="0"/>
+              <a:rPr lang="en-US"/>
               <a:t>Fifth level</a:t>
             </a:r>
-            <a:endParaRPr lang="en-US"/>
           </a:p>
         </p:txBody>
       </p:sp>
@@ -3089,7 +3067,7 @@
           <a:p>
             <a:fld id="{78C97017-6FC3-485B-9764-EAC9E56C1D49}" type="datetimeFigureOut">
               <a:rPr lang="en-US" smtClean="0"/>
-              <a:t>1/1/18</a:t>
+              <a:t>05-Apr-18</a:t>
             </a:fld>
             <a:endParaRPr lang="en-US"/>
           </a:p>
@@ -3510,7 +3488,7 @@
           <a:lstStyle/>
           <a:p>
             <a:r>
-              <a:rPr lang="en-US" sz="1200" b="1" dirty="0" smtClean="0">
+              <a:rPr lang="en-US" sz="1200" b="1" dirty="0">
                 <a:solidFill>
                   <a:srgbClr val="7030A0"/>
                 </a:solidFill>
@@ -3569,7 +3547,7 @@
           <a:p>
             <a:pPr algn="ctr"/>
             <a:r>
-              <a:rPr lang="en-US" sz="1050" dirty="0" err="1" smtClean="0">
+              <a:rPr lang="en-US" sz="1050" dirty="0" err="1">
                 <a:solidFill>
                   <a:schemeClr val="bg1"/>
                 </a:solidFill>
@@ -3628,7 +3606,7 @@
           <a:p>
             <a:pPr algn="ctr"/>
             <a:r>
-              <a:rPr lang="en-US" sz="1050" dirty="0" err="1" smtClean="0">
+              <a:rPr lang="en-US" sz="1050" dirty="0" err="1">
                 <a:solidFill>
                   <a:schemeClr val="bg1"/>
                 </a:solidFill>
@@ -3742,7 +3720,7 @@
           <a:p>
             <a:pPr algn="ctr"/>
             <a:r>
-              <a:rPr lang="en-US" sz="1050" dirty="0" smtClean="0">
+              <a:rPr lang="en-US" sz="1050" dirty="0">
                 <a:solidFill>
                   <a:schemeClr val="bg1"/>
                 </a:solidFill>
@@ -4015,12 +3993,12 @@
           <a:p>
             <a:pPr algn="ctr"/>
             <a:r>
-              <a:rPr lang="en-US" sz="1050" dirty="0" err="1" smtClean="0">
+              <a:rPr lang="en-US" sz="1050" dirty="0" err="1">
                 <a:solidFill>
                   <a:srgbClr val="7030A0"/>
                 </a:solidFill>
               </a:rPr>
-              <a:t>AddressBook</a:t>
+              <a:t>CoinBook</a:t>
             </a:r>
             <a:endParaRPr lang="en-SG" sz="1050" dirty="0">
               <a:solidFill>
@@ -4157,12 +4135,12 @@
           <a:p>
             <a:pPr algn="ctr"/>
             <a:r>
-              <a:rPr lang="en-US" sz="1050" dirty="0" err="1" smtClean="0">
+              <a:rPr lang="en-US" sz="1050" dirty="0" err="1">
                 <a:solidFill>
                   <a:srgbClr val="7030A0"/>
                 </a:solidFill>
               </a:rPr>
-              <a:t>UniquePersonList</a:t>
+              <a:t>UniqueCoinList</a:t>
             </a:r>
             <a:endParaRPr lang="en-SG" sz="1050" dirty="0">
               <a:solidFill>
@@ -4301,7 +4279,7 @@
           <a:p>
             <a:pPr algn="ctr"/>
             <a:r>
-              <a:rPr lang="en-US" sz="1050" dirty="0" err="1" smtClean="0">
+              <a:rPr lang="en-US" sz="1050" dirty="0" err="1">
                 <a:solidFill>
                   <a:srgbClr val="7030A0"/>
                 </a:solidFill>
@@ -4400,12 +4378,12 @@
           <a:p>
             <a:pPr algn="ctr"/>
             <a:r>
-              <a:rPr lang="en-US" sz="1050" dirty="0" smtClean="0">
+              <a:rPr lang="en-US" sz="1050" dirty="0">
                 <a:solidFill>
                   <a:srgbClr val="7030A0"/>
                 </a:solidFill>
               </a:rPr>
-              <a:t>Person</a:t>
+              <a:t>Coin</a:t>
             </a:r>
             <a:endParaRPr lang="en-SG" sz="1050" dirty="0">
               <a:solidFill>
@@ -4542,7 +4520,7 @@
           <a:p>
             <a:pPr algn="ctr"/>
             <a:r>
-              <a:rPr lang="en-US" sz="1050" dirty="0" smtClean="0">
+              <a:rPr lang="en-US" sz="1050" dirty="0">
                 <a:solidFill>
                   <a:srgbClr val="7030A0"/>
                 </a:solidFill>
@@ -4684,12 +4662,12 @@
           <a:p>
             <a:pPr algn="ctr"/>
             <a:r>
-              <a:rPr lang="en-US" sz="1050" dirty="0" smtClean="0">
+              <a:rPr lang="en-US" sz="1050" dirty="0">
                 <a:solidFill>
                   <a:srgbClr val="7030A0"/>
                 </a:solidFill>
               </a:rPr>
-              <a:t>Name</a:t>
+              <a:t>Code</a:t>
             </a:r>
             <a:endParaRPr lang="en-SG" sz="1050" dirty="0">
               <a:solidFill>
@@ -4828,12 +4806,12 @@
           <a:p>
             <a:pPr algn="ctr"/>
             <a:r>
-              <a:rPr lang="en-US" sz="1050" dirty="0" smtClean="0">
+              <a:rPr lang="en-US" sz="1050" dirty="0">
                 <a:solidFill>
                   <a:srgbClr val="7030A0"/>
                 </a:solidFill>
               </a:rPr>
-              <a:t>Phone</a:t>
+              <a:t>Price</a:t>
             </a:r>
             <a:endParaRPr lang="en-SG" sz="1050" dirty="0">
               <a:solidFill>
@@ -4925,12 +4903,12 @@
           <a:p>
             <a:pPr algn="ctr"/>
             <a:r>
-              <a:rPr lang="en-US" sz="1050" dirty="0" smtClean="0">
+              <a:rPr lang="en-US" sz="1050" dirty="0">
                 <a:solidFill>
                   <a:srgbClr val="7030A0"/>
                 </a:solidFill>
               </a:rPr>
-              <a:t>Email</a:t>
+              <a:t>Amount</a:t>
             </a:r>
             <a:endParaRPr lang="en-SG" sz="1050" dirty="0">
               <a:solidFill>
@@ -4953,103 +4931,6 @@
           <a:xfrm>
             <a:off x="7277995" y="3034891"/>
             <a:ext cx="434402" cy="318195"/>
-          </a:xfrm>
-          <a:prstGeom prst="bentConnector3">
-            <a:avLst/>
-          </a:prstGeom>
-          <a:ln w="19050">
-            <a:solidFill>
-              <a:srgbClr val="7030A0"/>
-            </a:solidFill>
-            <a:headEnd type="none" w="med" len="med"/>
-            <a:tailEnd type="arrow" w="med" len="med"/>
-          </a:ln>
-          <a:effectLst/>
-        </p:spPr>
-        <p:style>
-          <a:lnRef idx="1">
-            <a:schemeClr val="accent2"/>
-          </a:lnRef>
-          <a:fillRef idx="2">
-            <a:schemeClr val="accent2"/>
-          </a:fillRef>
-          <a:effectRef idx="1">
-            <a:schemeClr val="accent2"/>
-          </a:effectRef>
-          <a:fontRef idx="minor">
-            <a:schemeClr val="dk1"/>
-          </a:fontRef>
-        </p:style>
-      </p:cxnSp>
-      <p:sp>
-        <p:nvSpPr>
-          <p:cNvPr id="85" name="Rectangle 8"/>
-          <p:cNvSpPr/>
-          <p:nvPr/>
-        </p:nvSpPr>
-        <p:spPr>
-          <a:xfrm>
-            <a:off x="7712397" y="3533171"/>
-            <a:ext cx="708186" cy="285783"/>
-          </a:xfrm>
-          <a:prstGeom prst="rect">
-            <a:avLst/>
-          </a:prstGeom>
-          <a:ln w="19050">
-            <a:solidFill>
-              <a:srgbClr val="7030A0"/>
-            </a:solidFill>
-          </a:ln>
-          <a:effectLst/>
-        </p:spPr>
-        <p:style>
-          <a:lnRef idx="1">
-            <a:schemeClr val="accent4"/>
-          </a:lnRef>
-          <a:fillRef idx="2">
-            <a:schemeClr val="accent4"/>
-          </a:fillRef>
-          <a:effectRef idx="1">
-            <a:schemeClr val="accent4"/>
-          </a:effectRef>
-          <a:fontRef idx="minor">
-            <a:schemeClr val="dk1"/>
-          </a:fontRef>
-        </p:style>
-        <p:txBody>
-          <a:bodyPr rtlCol="0" anchor="ctr"/>
-          <a:lstStyle/>
-          <a:p>
-            <a:pPr algn="ctr"/>
-            <a:r>
-              <a:rPr lang="en-US" sz="1050" dirty="0" smtClean="0">
-                <a:solidFill>
-                  <a:srgbClr val="7030A0"/>
-                </a:solidFill>
-              </a:rPr>
-              <a:t>Address</a:t>
-            </a:r>
-            <a:endParaRPr lang="en-SG" sz="1050" dirty="0">
-              <a:solidFill>
-                <a:srgbClr val="7030A0"/>
-              </a:solidFill>
-            </a:endParaRPr>
-          </a:p>
-        </p:txBody>
-      </p:sp>
-      <p:cxnSp>
-        <p:nvCxnSpPr>
-          <p:cNvPr id="86" name="Elbow Connector 85"/>
-          <p:cNvCxnSpPr>
-            <a:stCxn id="78" idx="3"/>
-            <a:endCxn id="85" idx="1"/>
-          </p:cNvCxnSpPr>
-          <p:nvPr/>
-        </p:nvCxnSpPr>
-        <p:spPr>
-          <a:xfrm>
-            <a:off x="7277995" y="3034891"/>
-            <a:ext cx="434402" cy="641172"/>
           </a:xfrm>
           <a:prstGeom prst="bentConnector3">
             <a:avLst/>
@@ -5210,7 +5091,7 @@
           <a:p>
             <a:pPr algn="ctr"/>
             <a:r>
-              <a:rPr lang="en-US" sz="1050" dirty="0" smtClean="0">
+              <a:rPr lang="en-US" sz="1050" dirty="0">
                 <a:solidFill>
                   <a:srgbClr val="7030A0"/>
                 </a:solidFill>
@@ -5218,19 +5099,19 @@
               <a:t>&lt;&lt;interface&gt;&gt;</a:t>
             </a:r>
             <a:br>
-              <a:rPr lang="en-US" sz="1050" dirty="0" smtClean="0">
+              <a:rPr lang="en-US" sz="1050" dirty="0">
                 <a:solidFill>
                   <a:srgbClr val="7030A0"/>
                 </a:solidFill>
               </a:rPr>
             </a:br>
             <a:r>
-              <a:rPr lang="en-US" sz="1050" dirty="0" err="1" smtClean="0">
+              <a:rPr lang="en-US" sz="1050" dirty="0" err="1">
                 <a:solidFill>
                   <a:srgbClr val="7030A0"/>
                 </a:solidFill>
               </a:rPr>
-              <a:t>ReadOnlyAddressBook</a:t>
+              <a:t>ReadOnlyCoinBook</a:t>
             </a:r>
             <a:endParaRPr lang="en-SG" sz="1050" dirty="0">
               <a:solidFill>
@@ -5264,7 +5145,7 @@
           <a:p>
             <a:pPr algn="r"/>
             <a:r>
-              <a:rPr lang="en-US" sz="1100" dirty="0" smtClean="0">
+              <a:rPr lang="en-US" sz="1100" dirty="0">
                 <a:solidFill>
                   <a:srgbClr val="7030A0"/>
                 </a:solidFill>
@@ -5320,20 +5201,12 @@
           <a:p>
             <a:pPr algn="ctr"/>
             <a:r>
-              <a:rPr lang="en-US" sz="1050" dirty="0" smtClean="0">
+              <a:rPr lang="en-US" sz="1050" dirty="0">
                 <a:solidFill>
                   <a:srgbClr val="7030A0"/>
                 </a:solidFill>
               </a:rPr>
               <a:t>&lt;&lt;interface&gt;&gt;</a:t>
-            </a:r>
-            <a:r>
-              <a:rPr lang="en-US" sz="1050">
-                <a:solidFill>
-                  <a:srgbClr val="7030A0"/>
-                </a:solidFill>
-              </a:rPr>
-              <a:t/>
             </a:r>
             <a:br>
               <a:rPr lang="en-US" sz="1050">
@@ -5343,7 +5216,7 @@
               </a:rPr>
             </a:br>
             <a:r>
-              <a:rPr lang="en-US" sz="1050" dirty="0" err="1" smtClean="0">
+              <a:rPr lang="en-US" sz="1050" dirty="0" err="1">
                 <a:solidFill>
                   <a:srgbClr val="7030A0"/>
                 </a:solidFill>
@@ -5465,7 +5338,7 @@
           <a:p>
             <a:pPr algn="ctr"/>
             <a:r>
-              <a:rPr lang="en-US" sz="1100" dirty="0" smtClean="0">
+              <a:rPr lang="en-US" sz="1100" dirty="0">
                 <a:solidFill>
                   <a:srgbClr val="7030A0"/>
                 </a:solidFill>
@@ -5504,7 +5377,7 @@
           <a:p>
             <a:pPr algn="ctr"/>
             <a:r>
-              <a:rPr lang="en-US" sz="1100" dirty="0" smtClean="0">
+              <a:rPr lang="en-US" sz="1100" dirty="0">
                 <a:solidFill>
                   <a:srgbClr val="7030A0"/>
                 </a:solidFill>
@@ -5543,7 +5416,7 @@
           <a:p>
             <a:pPr algn="ctr"/>
             <a:r>
-              <a:rPr lang="en-US" sz="1100" dirty="0" smtClean="0">
+              <a:rPr lang="en-US" sz="1100" dirty="0">
                 <a:solidFill>
                   <a:srgbClr val="7030A0"/>
                 </a:solidFill>
@@ -5582,7 +5455,7 @@
           <a:p>
             <a:pPr algn="ctr"/>
             <a:r>
-              <a:rPr lang="en-US" sz="1100" dirty="0" smtClean="0">
+              <a:rPr lang="en-US" sz="1100" dirty="0">
                 <a:solidFill>
                   <a:srgbClr val="7030A0"/>
                 </a:solidFill>
@@ -5621,7 +5494,7 @@
           <a:p>
             <a:pPr algn="ctr"/>
             <a:r>
-              <a:rPr lang="en-US" sz="1100" dirty="0" smtClean="0">
+              <a:rPr lang="en-US" sz="1100" dirty="0">
                 <a:solidFill>
                   <a:srgbClr val="7030A0"/>
                 </a:solidFill>
@@ -5660,7 +5533,7 @@
           <a:p>
             <a:pPr algn="ctr"/>
             <a:r>
-              <a:rPr lang="en-US" sz="1100" dirty="0" smtClean="0">
+              <a:rPr lang="en-US" sz="1100" dirty="0">
                 <a:solidFill>
                   <a:srgbClr val="7030A0"/>
                 </a:solidFill>
@@ -5699,7 +5572,7 @@
           <a:p>
             <a:pPr algn="ctr"/>
             <a:r>
-              <a:rPr lang="en-US" sz="1100" dirty="0" smtClean="0">
+              <a:rPr lang="en-US" sz="1100" dirty="0">
                 <a:solidFill>
                   <a:srgbClr val="7030A0"/>
                 </a:solidFill>
@@ -5738,7 +5611,7 @@
           <a:p>
             <a:pPr algn="ctr"/>
             <a:r>
-              <a:rPr lang="en-US" sz="1100" dirty="0" smtClean="0">
+              <a:rPr lang="en-US" sz="1100" dirty="0">
                 <a:solidFill>
                   <a:srgbClr val="7030A0"/>
                 </a:solidFill>
@@ -5763,13 +5636,6 @@
   <p:clrMapOvr>
     <a:masterClrMapping/>
   </p:clrMapOvr>
-  <p:timing>
-    <p:tnLst>
-      <p:par>
-        <p:cTn id="1" dur="indefinite" restart="never" nodeType="tmRoot"/>
-      </p:par>
-    </p:tnLst>
-  </p:timing>
 </p:sld>
 </file>
 

</xml_diff>